<commit_message>
update some icons file
</commit_message>
<xml_diff>
--- a/images/icons/modulestack.pptx
+++ b/images/icons/modulestack.pptx
@@ -3429,6 +3429,316 @@
           </p:txBody>
         </p:sp>
       </p:grpSp>
+      <p:grpSp>
+        <p:nvGrpSpPr>
+          <p:cNvPr id="23" name="Group 22"/>
+          <p:cNvGrpSpPr/>
+          <p:nvPr/>
+        </p:nvGrpSpPr>
+        <p:grpSpPr>
+          <a:xfrm>
+            <a:off x="438538" y="3013788"/>
+            <a:ext cx="1427584" cy="1474236"/>
+            <a:chOff x="438538" y="3013788"/>
+            <a:chExt cx="1427584" cy="1474236"/>
+          </a:xfrm>
+        </p:grpSpPr>
+        <p:sp>
+          <p:nvSpPr>
+            <p:cNvPr id="18" name="Rectangle 17"/>
+            <p:cNvSpPr/>
+            <p:nvPr/>
+          </p:nvSpPr>
+          <p:spPr>
+            <a:xfrm>
+              <a:off x="438538" y="3013788"/>
+              <a:ext cx="1427584" cy="1474236"/>
+            </a:xfrm>
+            <a:prstGeom prst="rect">
+              <a:avLst/>
+            </a:prstGeom>
+            <a:ln w="38100">
+              <a:solidFill>
+                <a:schemeClr val="tx1"/>
+              </a:solidFill>
+            </a:ln>
+          </p:spPr>
+          <p:style>
+            <a:lnRef idx="2">
+              <a:schemeClr val="accent3">
+                <a:shade val="50000"/>
+              </a:schemeClr>
+            </a:lnRef>
+            <a:fillRef idx="1">
+              <a:schemeClr val="accent3"/>
+            </a:fillRef>
+            <a:effectRef idx="0">
+              <a:schemeClr val="accent3"/>
+            </a:effectRef>
+            <a:fontRef idx="minor">
+              <a:schemeClr val="lt1"/>
+            </a:fontRef>
+          </p:style>
+          <p:txBody>
+            <a:bodyPr rtlCol="0" anchor="ctr"/>
+            <a:lstStyle/>
+            <a:p>
+              <a:pPr algn="ctr"/>
+              <a:endParaRPr lang="en-US"/>
+            </a:p>
+          </p:txBody>
+        </p:sp>
+        <p:sp>
+          <p:nvSpPr>
+            <p:cNvPr id="19" name="Rectangle 18"/>
+            <p:cNvSpPr/>
+            <p:nvPr/>
+          </p:nvSpPr>
+          <p:spPr>
+            <a:xfrm>
+              <a:off x="615820" y="3200400"/>
+              <a:ext cx="1073020" cy="391886"/>
+            </a:xfrm>
+            <a:prstGeom prst="rect">
+              <a:avLst/>
+            </a:prstGeom>
+            <a:ln>
+              <a:solidFill>
+                <a:schemeClr val="tx1"/>
+              </a:solidFill>
+            </a:ln>
+          </p:spPr>
+          <p:style>
+            <a:lnRef idx="2">
+              <a:schemeClr val="accent1">
+                <a:shade val="50000"/>
+              </a:schemeClr>
+            </a:lnRef>
+            <a:fillRef idx="1">
+              <a:schemeClr val="accent1"/>
+            </a:fillRef>
+            <a:effectRef idx="0">
+              <a:schemeClr val="accent1"/>
+            </a:effectRef>
+            <a:fontRef idx="minor">
+              <a:schemeClr val="lt1"/>
+            </a:fontRef>
+          </p:style>
+          <p:txBody>
+            <a:bodyPr rtlCol="0" anchor="ctr"/>
+            <a:lstStyle/>
+            <a:p>
+              <a:pPr algn="ctr"/>
+              <a:endParaRPr lang="en-US"/>
+            </a:p>
+          </p:txBody>
+        </p:sp>
+        <p:sp>
+          <p:nvSpPr>
+            <p:cNvPr id="20" name="Rectangle 19"/>
+            <p:cNvSpPr/>
+            <p:nvPr/>
+          </p:nvSpPr>
+          <p:spPr>
+            <a:xfrm>
+              <a:off x="615820" y="3592286"/>
+              <a:ext cx="298580" cy="643812"/>
+            </a:xfrm>
+            <a:prstGeom prst="rect">
+              <a:avLst/>
+            </a:prstGeom>
+            <a:ln>
+              <a:solidFill>
+                <a:schemeClr val="tx1"/>
+              </a:solidFill>
+            </a:ln>
+          </p:spPr>
+          <p:style>
+            <a:lnRef idx="2">
+              <a:schemeClr val="accent1">
+                <a:shade val="50000"/>
+              </a:schemeClr>
+            </a:lnRef>
+            <a:fillRef idx="1">
+              <a:schemeClr val="accent1"/>
+            </a:fillRef>
+            <a:effectRef idx="0">
+              <a:schemeClr val="accent1"/>
+            </a:effectRef>
+            <a:fontRef idx="minor">
+              <a:schemeClr val="lt1"/>
+            </a:fontRef>
+          </p:style>
+          <p:txBody>
+            <a:bodyPr rtlCol="0" anchor="ctr"/>
+            <a:lstStyle/>
+            <a:p>
+              <a:pPr algn="ctr"/>
+              <a:endParaRPr lang="en-US"/>
+            </a:p>
+          </p:txBody>
+        </p:sp>
+        <p:sp>
+          <p:nvSpPr>
+            <p:cNvPr id="21" name="Rectangle 20"/>
+            <p:cNvSpPr/>
+            <p:nvPr/>
+          </p:nvSpPr>
+          <p:spPr>
+            <a:xfrm>
+              <a:off x="1390260" y="3592286"/>
+              <a:ext cx="298580" cy="643812"/>
+            </a:xfrm>
+            <a:prstGeom prst="rect">
+              <a:avLst/>
+            </a:prstGeom>
+            <a:ln>
+              <a:solidFill>
+                <a:schemeClr val="tx1"/>
+              </a:solidFill>
+            </a:ln>
+          </p:spPr>
+          <p:style>
+            <a:lnRef idx="2">
+              <a:schemeClr val="accent1">
+                <a:shade val="50000"/>
+              </a:schemeClr>
+            </a:lnRef>
+            <a:fillRef idx="1">
+              <a:schemeClr val="accent1"/>
+            </a:fillRef>
+            <a:effectRef idx="0">
+              <a:schemeClr val="accent1"/>
+            </a:effectRef>
+            <a:fontRef idx="minor">
+              <a:schemeClr val="lt1"/>
+            </a:fontRef>
+          </p:style>
+          <p:txBody>
+            <a:bodyPr rtlCol="0" anchor="ctr"/>
+            <a:lstStyle/>
+            <a:p>
+              <a:pPr algn="ctr"/>
+              <a:endParaRPr lang="en-US"/>
+            </a:p>
+          </p:txBody>
+        </p:sp>
+        <p:sp>
+          <p:nvSpPr>
+            <p:cNvPr id="22" name="Rectangle 21"/>
+            <p:cNvSpPr/>
+            <p:nvPr/>
+          </p:nvSpPr>
+          <p:spPr>
+            <a:xfrm>
+              <a:off x="1003040" y="3655267"/>
+              <a:ext cx="298580" cy="517849"/>
+            </a:xfrm>
+            <a:prstGeom prst="rect">
+              <a:avLst/>
+            </a:prstGeom>
+            <a:ln>
+              <a:solidFill>
+                <a:schemeClr val="tx1"/>
+              </a:solidFill>
+            </a:ln>
+          </p:spPr>
+          <p:style>
+            <a:lnRef idx="2">
+              <a:schemeClr val="accent2">
+                <a:shade val="50000"/>
+              </a:schemeClr>
+            </a:lnRef>
+            <a:fillRef idx="1">
+              <a:schemeClr val="accent2"/>
+            </a:fillRef>
+            <a:effectRef idx="0">
+              <a:schemeClr val="accent2"/>
+            </a:effectRef>
+            <a:fontRef idx="minor">
+              <a:schemeClr val="lt1"/>
+            </a:fontRef>
+          </p:style>
+          <p:txBody>
+            <a:bodyPr rtlCol="0" anchor="ctr"/>
+            <a:lstStyle/>
+            <a:p>
+              <a:pPr algn="ctr"/>
+              <a:endParaRPr lang="en-US"/>
+            </a:p>
+          </p:txBody>
+        </p:sp>
+      </p:grpSp>
+      <p:pic>
+        <p:nvPicPr>
+          <p:cNvPr id="27" name="Picture 26" descr="Screen Clipping"/>
+          <p:cNvPicPr>
+            <a:picLocks noChangeAspect="1"/>
+          </p:cNvPicPr>
+          <p:nvPr/>
+        </p:nvPicPr>
+        <p:blipFill>
+          <a:blip r:embed="rId2" cstate="print">
+            <a:extLst>
+              <a:ext uri="{28A0092B-C50C-407E-A947-70E740481C1C}">
+                <a14:useLocalDpi xmlns:a14="http://schemas.microsoft.com/office/drawing/2010/main" val="0"/>
+              </a:ext>
+            </a:extLst>
+          </a:blip>
+          <a:stretch>
+            <a:fillRect/>
+          </a:stretch>
+        </p:blipFill>
+        <p:spPr>
+          <a:xfrm>
+            <a:off x="5248469" y="3013789"/>
+            <a:ext cx="1427584" cy="1474236"/>
+          </a:xfrm>
+          <a:prstGeom prst="rect">
+            <a:avLst/>
+          </a:prstGeom>
+          <a:ln w="38100">
+            <a:solidFill>
+              <a:schemeClr val="tx1"/>
+            </a:solidFill>
+          </a:ln>
+        </p:spPr>
+      </p:pic>
+      <p:pic>
+        <p:nvPicPr>
+          <p:cNvPr id="28" name="Picture 27" descr="Screen Clipping"/>
+          <p:cNvPicPr>
+            <a:picLocks noChangeAspect="1"/>
+          </p:cNvPicPr>
+          <p:nvPr/>
+        </p:nvPicPr>
+        <p:blipFill>
+          <a:blip r:embed="rId3">
+            <a:extLst>
+              <a:ext uri="{28A0092B-C50C-407E-A947-70E740481C1C}">
+                <a14:useLocalDpi xmlns:a14="http://schemas.microsoft.com/office/drawing/2010/main" val="0"/>
+              </a:ext>
+            </a:extLst>
+          </a:blip>
+          <a:stretch>
+            <a:fillRect/>
+          </a:stretch>
+        </p:blipFill>
+        <p:spPr>
+          <a:xfrm>
+            <a:off x="2690325" y="3013788"/>
+            <a:ext cx="1427585" cy="1474236"/>
+          </a:xfrm>
+          <a:prstGeom prst="rect">
+            <a:avLst/>
+          </a:prstGeom>
+          <a:ln w="38100">
+            <a:solidFill>
+              <a:schemeClr val="tx1"/>
+            </a:solidFill>
+          </a:ln>
+        </p:spPr>
+      </p:pic>
     </p:spTree>
     <p:extLst>
       <p:ext uri="{BB962C8B-B14F-4D97-AF65-F5344CB8AC3E}">

</xml_diff>